<commit_message>
add proof for Dirichlet..
</commit_message>
<xml_diff>
--- a/classes/stats2018/Lecture06_AndOneHalf.pptx
+++ b/classes/stats2018/Lecture06_AndOneHalf.pptx
@@ -13,14 +13,16 @@
     <p:sldId id="260" r:id="rId7"/>
     <p:sldId id="261" r:id="rId8"/>
     <p:sldId id="262" r:id="rId9"/>
-    <p:sldId id="263" r:id="rId10"/>
-    <p:sldId id="268" r:id="rId11"/>
-    <p:sldId id="265" r:id="rId12"/>
-    <p:sldId id="266" r:id="rId13"/>
-    <p:sldId id="267" r:id="rId14"/>
-    <p:sldId id="269" r:id="rId15"/>
-    <p:sldId id="270" r:id="rId16"/>
-    <p:sldId id="271" r:id="rId17"/>
+    <p:sldId id="273" r:id="rId10"/>
+    <p:sldId id="263" r:id="rId11"/>
+    <p:sldId id="268" r:id="rId12"/>
+    <p:sldId id="272" r:id="rId13"/>
+    <p:sldId id="265" r:id="rId14"/>
+    <p:sldId id="266" r:id="rId15"/>
+    <p:sldId id="267" r:id="rId16"/>
+    <p:sldId id="269" r:id="rId17"/>
+    <p:sldId id="270" r:id="rId18"/>
+    <p:sldId id="271" r:id="rId19"/>
   </p:sldIdLst>
   <p:sldSz cx="12192000" cy="6858000"/>
   <p:notesSz cx="6858000" cy="9144000"/>
@@ -119,11 +121,12 @@
       </a:defRPr>
     </a:lvl9pPr>
   </p:defaultTextStyle>
+  <p:extLst>
+    <p:ext uri="{EFAFB233-063F-42B5-8137-9DF3F51BA10A}">
+      <p15:sldGuideLst xmlns:p15="http://schemas.microsoft.com/office/powerpoint/2012/main"/>
+    </p:ext>
+  </p:extLst>
 </p:presentation>
-</file>
-
-<file path=ppt/revisionInfo.xml><?xml version="1.0" encoding="utf-8"?>
-<p1510:revInfo xmlns:a="http://schemas.openxmlformats.org/drawingml/2006/main" xmlns:r="http://schemas.openxmlformats.org/officeDocument/2006/relationships" xmlns:p1510="http://schemas.microsoft.com/office/powerpoint/2015/10/main"/>
 </file>
 
 <file path=ppt/slideLayouts/slideLayout1.xml><?xml version="1.0" encoding="utf-8"?>
@@ -273,7 +276,7 @@
           <a:p>
             <a:fld id="{37108834-519E-4021-A54F-D2F99E1B55A7}" type="datetimeFigureOut">
               <a:rPr lang="en-US" smtClean="0"/>
-              <a:t>2/4/2018</a:t>
+              <a:t>2/5/2018</a:t>
             </a:fld>
             <a:endParaRPr lang="en-US"/>
           </a:p>
@@ -471,7 +474,7 @@
           <a:p>
             <a:fld id="{37108834-519E-4021-A54F-D2F99E1B55A7}" type="datetimeFigureOut">
               <a:rPr lang="en-US" smtClean="0"/>
-              <a:t>2/4/2018</a:t>
+              <a:t>2/5/2018</a:t>
             </a:fld>
             <a:endParaRPr lang="en-US"/>
           </a:p>
@@ -679,7 +682,7 @@
           <a:p>
             <a:fld id="{37108834-519E-4021-A54F-D2F99E1B55A7}" type="datetimeFigureOut">
               <a:rPr lang="en-US" smtClean="0"/>
-              <a:t>2/4/2018</a:t>
+              <a:t>2/5/2018</a:t>
             </a:fld>
             <a:endParaRPr lang="en-US"/>
           </a:p>
@@ -877,7 +880,7 @@
           <a:p>
             <a:fld id="{37108834-519E-4021-A54F-D2F99E1B55A7}" type="datetimeFigureOut">
               <a:rPr lang="en-US" smtClean="0"/>
-              <a:t>2/4/2018</a:t>
+              <a:t>2/5/2018</a:t>
             </a:fld>
             <a:endParaRPr lang="en-US"/>
           </a:p>
@@ -1152,7 +1155,7 @@
           <a:p>
             <a:fld id="{37108834-519E-4021-A54F-D2F99E1B55A7}" type="datetimeFigureOut">
               <a:rPr lang="en-US" smtClean="0"/>
-              <a:t>2/4/2018</a:t>
+              <a:t>2/5/2018</a:t>
             </a:fld>
             <a:endParaRPr lang="en-US"/>
           </a:p>
@@ -1417,7 +1420,7 @@
           <a:p>
             <a:fld id="{37108834-519E-4021-A54F-D2F99E1B55A7}" type="datetimeFigureOut">
               <a:rPr lang="en-US" smtClean="0"/>
-              <a:t>2/4/2018</a:t>
+              <a:t>2/5/2018</a:t>
             </a:fld>
             <a:endParaRPr lang="en-US"/>
           </a:p>
@@ -1829,7 +1832,7 @@
           <a:p>
             <a:fld id="{37108834-519E-4021-A54F-D2F99E1B55A7}" type="datetimeFigureOut">
               <a:rPr lang="en-US" smtClean="0"/>
-              <a:t>2/4/2018</a:t>
+              <a:t>2/5/2018</a:t>
             </a:fld>
             <a:endParaRPr lang="en-US"/>
           </a:p>
@@ -1970,7 +1973,7 @@
           <a:p>
             <a:fld id="{37108834-519E-4021-A54F-D2F99E1B55A7}" type="datetimeFigureOut">
               <a:rPr lang="en-US" smtClean="0"/>
-              <a:t>2/4/2018</a:t>
+              <a:t>2/5/2018</a:t>
             </a:fld>
             <a:endParaRPr lang="en-US"/>
           </a:p>
@@ -2083,7 +2086,7 @@
           <a:p>
             <a:fld id="{37108834-519E-4021-A54F-D2F99E1B55A7}" type="datetimeFigureOut">
               <a:rPr lang="en-US" smtClean="0"/>
-              <a:t>2/4/2018</a:t>
+              <a:t>2/5/2018</a:t>
             </a:fld>
             <a:endParaRPr lang="en-US"/>
           </a:p>
@@ -2394,7 +2397,7 @@
           <a:p>
             <a:fld id="{37108834-519E-4021-A54F-D2F99E1B55A7}" type="datetimeFigureOut">
               <a:rPr lang="en-US" smtClean="0"/>
-              <a:t>2/4/2018</a:t>
+              <a:t>2/5/2018</a:t>
             </a:fld>
             <a:endParaRPr lang="en-US"/>
           </a:p>
@@ -2682,7 +2685,7 @@
           <a:p>
             <a:fld id="{37108834-519E-4021-A54F-D2F99E1B55A7}" type="datetimeFigureOut">
               <a:rPr lang="en-US" smtClean="0"/>
-              <a:t>2/4/2018</a:t>
+              <a:t>2/5/2018</a:t>
             </a:fld>
             <a:endParaRPr lang="en-US"/>
           </a:p>
@@ -2923,7 +2926,7 @@
           <a:p>
             <a:fld id="{37108834-519E-4021-A54F-D2F99E1B55A7}" type="datetimeFigureOut">
               <a:rPr lang="en-US" smtClean="0"/>
-              <a:t>2/4/2018</a:t>
+              <a:t>2/5/2018</a:t>
             </a:fld>
             <a:endParaRPr lang="en-US"/>
           </a:p>
@@ -3463,7 +3466,7 @@
           <p:cNvPr id="4" name="TextBox 3">
             <a:extLst>
               <a:ext uri="{FF2B5EF4-FFF2-40B4-BE49-F238E27FC236}">
-                <a16:creationId xmlns:a16="http://schemas.microsoft.com/office/drawing/2014/main" id="{65031860-7A1A-42EB-B746-6C197E69FC4D}"/>
+                <a16:creationId xmlns:a16="http://schemas.microsoft.com/office/drawing/2014/main" id="{383F9260-A1C3-4D2C-AF16-D8D7A2F07C51}"/>
               </a:ext>
             </a:extLst>
           </p:cNvPr>
@@ -3472,8 +3475,8 @@
         </p:nvSpPr>
         <p:spPr>
           <a:xfrm>
-            <a:off x="653143" y="296883"/>
-            <a:ext cx="10354117" cy="1200329"/>
+            <a:off x="819397" y="285008"/>
+            <a:ext cx="6823343" cy="369332"/>
           </a:xfrm>
           <a:prstGeom prst="rect">
             <a:avLst/>
@@ -3491,22 +3494,7 @@
                 <a:latin typeface="Arial" panose="020B0604020202020204" pitchFamily="34" charset="0"/>
                 <a:cs typeface="Arial" panose="020B0604020202020204" pitchFamily="34" charset="0"/>
               </a:rPr>
-              <a:t>We state without proof:</a:t>
-            </a:r>
-          </a:p>
-          <a:p>
-            <a:endParaRPr lang="en-US" dirty="0">
-              <a:latin typeface="Arial" panose="020B0604020202020204" pitchFamily="34" charset="0"/>
-              <a:cs typeface="Arial" panose="020B0604020202020204" pitchFamily="34" charset="0"/>
-            </a:endParaRPr>
-          </a:p>
-          <a:p>
-            <a:r>
-              <a:rPr lang="en-US" dirty="0">
-                <a:latin typeface="Arial" panose="020B0604020202020204" pitchFamily="34" charset="0"/>
-                <a:cs typeface="Arial" panose="020B0604020202020204" pitchFamily="34" charset="0"/>
-              </a:rPr>
-              <a:t>The </a:t>
+              <a:t>We can recover the beta distribution from the </a:t>
             </a:r>
             <a:r>
               <a:rPr lang="en-US" dirty="0" err="1">
@@ -3520,38 +3508,75 @@
                 <a:latin typeface="Arial" panose="020B0604020202020204" pitchFamily="34" charset="0"/>
                 <a:cs typeface="Arial" panose="020B0604020202020204" pitchFamily="34" charset="0"/>
               </a:rPr>
-              <a:t> is the conjugate prior of the multinomial.</a:t>
-            </a:r>
-          </a:p>
-          <a:p>
-            <a:r>
-              <a:rPr lang="en-US" dirty="0">
-                <a:latin typeface="Arial" panose="020B0604020202020204" pitchFamily="34" charset="0"/>
-                <a:cs typeface="Arial" panose="020B0604020202020204" pitchFamily="34" charset="0"/>
-              </a:rPr>
-              <a:t>The update rules for the </a:t>
-            </a:r>
-            <a:r>
-              <a:rPr lang="en-US" dirty="0" err="1">
-                <a:latin typeface="Arial" panose="020B0604020202020204" pitchFamily="34" charset="0"/>
-                <a:cs typeface="Arial" panose="020B0604020202020204" pitchFamily="34" charset="0"/>
-              </a:rPr>
-              <a:t>Dirichlet</a:t>
-            </a:r>
-            <a:r>
-              <a:rPr lang="en-US" dirty="0">
-                <a:latin typeface="Arial" panose="020B0604020202020204" pitchFamily="34" charset="0"/>
-                <a:cs typeface="Arial" panose="020B0604020202020204" pitchFamily="34" charset="0"/>
-              </a:rPr>
-              <a:t> work in the same way as for the beta (add 1 for each observation..)</a:t>
-            </a:r>
-          </a:p>
-        </p:txBody>
-      </p:sp>
+              <a:t> distribution</a:t>
+            </a:r>
+          </a:p>
+        </p:txBody>
+      </p:sp>
+      <p:pic>
+        <p:nvPicPr>
+          <p:cNvPr id="5" name="Picture 4">
+            <a:extLst>
+              <a:ext uri="{FF2B5EF4-FFF2-40B4-BE49-F238E27FC236}">
+                <a16:creationId xmlns:a16="http://schemas.microsoft.com/office/drawing/2014/main" id="{0E60C042-F46D-4F54-BB50-7E369903FF29}"/>
+              </a:ext>
+            </a:extLst>
+          </p:cNvPr>
+          <p:cNvPicPr>
+            <a:picLocks noChangeAspect="1"/>
+          </p:cNvPicPr>
+          <p:nvPr/>
+        </p:nvPicPr>
+        <p:blipFill>
+          <a:blip r:embed="rId2"/>
+          <a:stretch>
+            <a:fillRect/>
+          </a:stretch>
+        </p:blipFill>
+        <p:spPr>
+          <a:xfrm>
+            <a:off x="108166" y="741279"/>
+            <a:ext cx="7153275" cy="3000375"/>
+          </a:xfrm>
+          <a:prstGeom prst="rect">
+            <a:avLst/>
+          </a:prstGeom>
+        </p:spPr>
+      </p:pic>
+      <p:pic>
+        <p:nvPicPr>
+          <p:cNvPr id="6" name="Picture 5">
+            <a:extLst>
+              <a:ext uri="{FF2B5EF4-FFF2-40B4-BE49-F238E27FC236}">
+                <a16:creationId xmlns:a16="http://schemas.microsoft.com/office/drawing/2014/main" id="{3CD87EB4-563B-435D-93BB-E97B83802142}"/>
+              </a:ext>
+            </a:extLst>
+          </p:cNvPr>
+          <p:cNvPicPr>
+            <a:picLocks noChangeAspect="1"/>
+          </p:cNvPicPr>
+          <p:nvPr/>
+        </p:nvPicPr>
+        <p:blipFill>
+          <a:blip r:embed="rId3"/>
+          <a:stretch>
+            <a:fillRect/>
+          </a:stretch>
+        </p:blipFill>
+        <p:spPr>
+          <a:xfrm>
+            <a:off x="6863938" y="951016"/>
+            <a:ext cx="5058886" cy="5082710"/>
+          </a:xfrm>
+          <a:prstGeom prst="rect">
+            <a:avLst/>
+          </a:prstGeom>
+        </p:spPr>
+      </p:pic>
     </p:spTree>
     <p:extLst>
       <p:ext uri="{BB962C8B-B14F-4D97-AF65-F5344CB8AC3E}">
-        <p14:creationId xmlns:p14="http://schemas.microsoft.com/office/powerpoint/2010/main" val="2141331997"/>
+        <p14:creationId xmlns:p14="http://schemas.microsoft.com/office/powerpoint/2010/main" val="561563434"/>
       </p:ext>
     </p:extLst>
   </p:cSld>
@@ -3583,7 +3608,7 @@
           <p:cNvPr id="4" name="TextBox 3">
             <a:extLst>
               <a:ext uri="{FF2B5EF4-FFF2-40B4-BE49-F238E27FC236}">
-                <a16:creationId xmlns:a16="http://schemas.microsoft.com/office/drawing/2014/main" id="{D8F1F398-5B8E-4324-8EA9-B2C516541B40}"/>
+                <a16:creationId xmlns:a16="http://schemas.microsoft.com/office/drawing/2014/main" id="{65031860-7A1A-42EB-B746-6C197E69FC4D}"/>
               </a:ext>
             </a:extLst>
           </p:cNvPr>
@@ -3592,8 +3617,8 @@
         </p:nvSpPr>
         <p:spPr>
           <a:xfrm>
-            <a:off x="35626" y="11876"/>
-            <a:ext cx="9567043" cy="646331"/>
+            <a:off x="536303" y="114003"/>
+            <a:ext cx="10431061" cy="646331"/>
           </a:xfrm>
           <a:prstGeom prst="rect">
             <a:avLst/>
@@ -3611,7 +3636,16 @@
                 <a:latin typeface="Arial" panose="020B0604020202020204" pitchFamily="34" charset="0"/>
                 <a:cs typeface="Arial" panose="020B0604020202020204" pitchFamily="34" charset="0"/>
               </a:rPr>
-              <a:t>Because all the x values have to sum up to 1, the </a:t>
+              <a:t>The Dirichlet is the conjugate prior of the multinomial.</a:t>
+            </a:r>
+          </a:p>
+          <a:p>
+            <a:r>
+              <a:rPr lang="en-US" dirty="0">
+                <a:latin typeface="Arial" panose="020B0604020202020204" pitchFamily="34" charset="0"/>
+                <a:cs typeface="Arial" panose="020B0604020202020204" pitchFamily="34" charset="0"/>
+              </a:rPr>
+              <a:t>The update rules for the </a:t>
             </a:r>
             <a:r>
               <a:rPr lang="en-US" dirty="0" err="1">
@@ -3625,74 +3659,17 @@
                 <a:latin typeface="Arial" panose="020B0604020202020204" pitchFamily="34" charset="0"/>
                 <a:cs typeface="Arial" panose="020B0604020202020204" pitchFamily="34" charset="0"/>
               </a:rPr>
-              <a:t> is described by a R</a:t>
-            </a:r>
-            <a:r>
-              <a:rPr lang="en-US" baseline="30000" dirty="0">
-                <a:latin typeface="Arial" panose="020B0604020202020204" pitchFamily="34" charset="0"/>
-                <a:cs typeface="Arial" panose="020B0604020202020204" pitchFamily="34" charset="0"/>
-              </a:rPr>
-              <a:t>(k-1)</a:t>
-            </a:r>
-            <a:r>
-              <a:rPr lang="en-US" dirty="0">
-                <a:latin typeface="Arial" panose="020B0604020202020204" pitchFamily="34" charset="0"/>
-                <a:cs typeface="Arial" panose="020B0604020202020204" pitchFamily="34" charset="0"/>
-              </a:rPr>
-              <a:t> subspace.</a:t>
-            </a:r>
-          </a:p>
-          <a:p>
-            <a:r>
-              <a:rPr lang="en-US" dirty="0">
-                <a:latin typeface="Arial" panose="020B0604020202020204" pitchFamily="34" charset="0"/>
-                <a:cs typeface="Arial" panose="020B0604020202020204" pitchFamily="34" charset="0"/>
-              </a:rPr>
-              <a:t>  </a:t>
-            </a:r>
-          </a:p>
-        </p:txBody>
-      </p:sp>
-      <p:sp>
-        <p:nvSpPr>
-          <p:cNvPr id="6" name="Rectangle 5">
-            <a:extLst>
-              <a:ext uri="{FF2B5EF4-FFF2-40B4-BE49-F238E27FC236}">
-                <a16:creationId xmlns:a16="http://schemas.microsoft.com/office/drawing/2014/main" id="{EEB25306-47A5-47E7-834D-C7CE85964843}"/>
-              </a:ext>
-            </a:extLst>
-          </p:cNvPr>
-          <p:cNvSpPr/>
-          <p:nvPr/>
-        </p:nvSpPr>
-        <p:spPr>
-          <a:xfrm>
-            <a:off x="4152404" y="6500543"/>
-            <a:ext cx="11685320" cy="307777"/>
-          </a:xfrm>
-          <a:prstGeom prst="rect">
-            <a:avLst/>
-          </a:prstGeom>
-        </p:spPr>
-        <p:txBody>
-          <a:bodyPr wrap="square">
-            <a:spAutoFit/>
-          </a:bodyPr>
-          <a:lstStyle/>
-          <a:p>
-            <a:r>
-              <a:rPr lang="en-US" sz="1400" dirty="0"/>
-              <a:t>https://github.com/afodor/metagenomicsTools/blob/master/src/classExamples/dirichletUpdateCoinFlip.txt</a:t>
+              <a:t> work in the same way as for the beta (add 1 for each observation..)</a:t>
             </a:r>
           </a:p>
         </p:txBody>
       </p:sp>
       <p:pic>
         <p:nvPicPr>
-          <p:cNvPr id="7" name="Picture 6">
-            <a:extLst>
-              <a:ext uri="{FF2B5EF4-FFF2-40B4-BE49-F238E27FC236}">
-                <a16:creationId xmlns:a16="http://schemas.microsoft.com/office/drawing/2014/main" id="{F7EBE343-6C28-437F-ADEA-0CF3CD21EBB2}"/>
+          <p:cNvPr id="2" name="Picture 1">
+            <a:extLst>
+              <a:ext uri="{FF2B5EF4-FFF2-40B4-BE49-F238E27FC236}">
+                <a16:creationId xmlns:a16="http://schemas.microsoft.com/office/drawing/2014/main" id="{688F6904-7213-4CB3-8303-F43839D2D679}"/>
               </a:ext>
             </a:extLst>
           </p:cNvPr>
@@ -3709,90 +3686,20 @@
         </p:blipFill>
         <p:spPr>
           <a:xfrm>
-            <a:off x="487646" y="539292"/>
-            <a:ext cx="3664758" cy="6080166"/>
+            <a:off x="152583" y="827163"/>
+            <a:ext cx="6603633" cy="3842871"/>
           </a:xfrm>
           <a:prstGeom prst="rect">
             <a:avLst/>
           </a:prstGeom>
         </p:spPr>
       </p:pic>
-      <p:sp>
-        <p:nvSpPr>
-          <p:cNvPr id="8" name="TextBox 7">
-            <a:extLst>
-              <a:ext uri="{FF2B5EF4-FFF2-40B4-BE49-F238E27FC236}">
-                <a16:creationId xmlns:a16="http://schemas.microsoft.com/office/drawing/2014/main" id="{B5EBFEC8-D5D5-4738-9369-ECF949EFA4D0}"/>
-              </a:ext>
-            </a:extLst>
-          </p:cNvPr>
-          <p:cNvSpPr txBox="1"/>
-          <p:nvPr/>
-        </p:nvSpPr>
-        <p:spPr>
-          <a:xfrm>
-            <a:off x="4819147" y="539292"/>
-            <a:ext cx="7314823" cy="923330"/>
-          </a:xfrm>
-          <a:prstGeom prst="rect">
-            <a:avLst/>
-          </a:prstGeom>
-          <a:noFill/>
-        </p:spPr>
-        <p:txBody>
-          <a:bodyPr wrap="none" rtlCol="0">
-            <a:spAutoFit/>
-          </a:bodyPr>
-          <a:lstStyle/>
-          <a:p>
-            <a:r>
-              <a:rPr lang="en-US" dirty="0">
-                <a:latin typeface="Arial" panose="020B0604020202020204" pitchFamily="34" charset="0"/>
-                <a:cs typeface="Arial" panose="020B0604020202020204" pitchFamily="34" charset="0"/>
-              </a:rPr>
-              <a:t>Our belief in the number of heads perfectly describes our belief in the </a:t>
-            </a:r>
-          </a:p>
-          <a:p>
-            <a:r>
-              <a:rPr lang="en-US" dirty="0">
-                <a:latin typeface="Arial" panose="020B0604020202020204" pitchFamily="34" charset="0"/>
-                <a:cs typeface="Arial" panose="020B0604020202020204" pitchFamily="34" charset="0"/>
-              </a:rPr>
-              <a:t>number of tails, so you capture the </a:t>
-            </a:r>
-            <a:r>
-              <a:rPr lang="en-US" dirty="0" err="1">
-                <a:latin typeface="Arial" panose="020B0604020202020204" pitchFamily="34" charset="0"/>
-                <a:cs typeface="Arial" panose="020B0604020202020204" pitchFamily="34" charset="0"/>
-              </a:rPr>
-              <a:t>Dirichlet</a:t>
-            </a:r>
-            <a:r>
-              <a:rPr lang="en-US" dirty="0">
-                <a:latin typeface="Arial" panose="020B0604020202020204" pitchFamily="34" charset="0"/>
-                <a:cs typeface="Arial" panose="020B0604020202020204" pitchFamily="34" charset="0"/>
-              </a:rPr>
-              <a:t> for a coin </a:t>
-            </a:r>
-          </a:p>
-          <a:p>
-            <a:r>
-              <a:rPr lang="en-US" dirty="0">
-                <a:latin typeface="Arial" panose="020B0604020202020204" pitchFamily="34" charset="0"/>
-                <a:cs typeface="Arial" panose="020B0604020202020204" pitchFamily="34" charset="0"/>
-              </a:rPr>
-              <a:t>in (2-1) = 1 dimension.</a:t>
-            </a:r>
-          </a:p>
-        </p:txBody>
-      </p:sp>
       <p:pic>
         <p:nvPicPr>
-          <p:cNvPr id="9" name="Picture 8">
-            <a:extLst>
-              <a:ext uri="{FF2B5EF4-FFF2-40B4-BE49-F238E27FC236}">
-                <a16:creationId xmlns:a16="http://schemas.microsoft.com/office/drawing/2014/main" id="{F6C4C23A-3C8E-4841-8147-EB63674D7FBD}"/>
+          <p:cNvPr id="3" name="Picture 2">
+            <a:extLst>
+              <a:ext uri="{FF2B5EF4-FFF2-40B4-BE49-F238E27FC236}">
+                <a16:creationId xmlns:a16="http://schemas.microsoft.com/office/drawing/2014/main" id="{0F672F56-D58A-4D48-993A-CEC79E623D31}"/>
               </a:ext>
             </a:extLst>
           </p:cNvPr>
@@ -3809,8 +3716,8 @@
         </p:blipFill>
         <p:spPr>
           <a:xfrm>
-            <a:off x="5251553" y="1990038"/>
-            <a:ext cx="4657725" cy="4324350"/>
+            <a:off x="4922520" y="4664954"/>
+            <a:ext cx="5567680" cy="2053298"/>
           </a:xfrm>
           <a:prstGeom prst="rect">
             <a:avLst/>
@@ -3820,7 +3727,7 @@
     </p:spTree>
     <p:extLst>
       <p:ext uri="{BB962C8B-B14F-4D97-AF65-F5344CB8AC3E}">
-        <p14:creationId xmlns:p14="http://schemas.microsoft.com/office/powerpoint/2010/main" val="1521341089"/>
+        <p14:creationId xmlns:p14="http://schemas.microsoft.com/office/powerpoint/2010/main" val="2141331997"/>
       </p:ext>
     </p:extLst>
   </p:cSld>
@@ -3849,10 +3756,10 @@
       </p:grpSpPr>
       <p:sp>
         <p:nvSpPr>
-          <p:cNvPr id="4" name="TextBox 3">
-            <a:extLst>
-              <a:ext uri="{FF2B5EF4-FFF2-40B4-BE49-F238E27FC236}">
-                <a16:creationId xmlns:a16="http://schemas.microsoft.com/office/drawing/2014/main" id="{A3E324D7-2011-45EC-80F6-F854E1128B60}"/>
+          <p:cNvPr id="5" name="TextBox 4">
+            <a:extLst>
+              <a:ext uri="{FF2B5EF4-FFF2-40B4-BE49-F238E27FC236}">
+                <a16:creationId xmlns:a16="http://schemas.microsoft.com/office/drawing/2014/main" id="{B43DA392-5F2F-4406-904A-1EFFF7BB5ABB}"/>
               </a:ext>
             </a:extLst>
           </p:cNvPr>
@@ -3861,8 +3768,8 @@
         </p:nvSpPr>
         <p:spPr>
           <a:xfrm>
-            <a:off x="463138" y="427512"/>
-            <a:ext cx="8212505" cy="2308324"/>
+            <a:off x="536303" y="114003"/>
+            <a:ext cx="10431061" cy="646331"/>
           </a:xfrm>
           <a:prstGeom prst="rect">
             <a:avLst/>
@@ -3880,7 +3787,16 @@
                 <a:latin typeface="Arial" panose="020B0604020202020204" pitchFamily="34" charset="0"/>
                 <a:cs typeface="Arial" panose="020B0604020202020204" pitchFamily="34" charset="0"/>
               </a:rPr>
-              <a:t>The </a:t>
+              <a:t>The Dirichlet is the conjugate prior of the multinomial.</a:t>
+            </a:r>
+          </a:p>
+          <a:p>
+            <a:r>
+              <a:rPr lang="en-US" dirty="0">
+                <a:latin typeface="Arial" panose="020B0604020202020204" pitchFamily="34" charset="0"/>
+                <a:cs typeface="Arial" panose="020B0604020202020204" pitchFamily="34" charset="0"/>
+              </a:rPr>
+              <a:t>The update rules for the </a:t>
             </a:r>
             <a:r>
               <a:rPr lang="en-US" dirty="0" err="1">
@@ -3894,82 +3810,17 @@
                 <a:latin typeface="Arial" panose="020B0604020202020204" pitchFamily="34" charset="0"/>
                 <a:cs typeface="Arial" panose="020B0604020202020204" pitchFamily="34" charset="0"/>
               </a:rPr>
-              <a:t> describes compositional data.  Data that sums to a constant.</a:t>
-            </a:r>
-          </a:p>
-          <a:p>
-            <a:r>
-              <a:rPr lang="en-US" dirty="0">
-                <a:latin typeface="Arial" panose="020B0604020202020204" pitchFamily="34" charset="0"/>
-                <a:cs typeface="Arial" panose="020B0604020202020204" pitchFamily="34" charset="0"/>
-              </a:rPr>
-              <a:t>Relative abundance.</a:t>
-            </a:r>
-          </a:p>
-          <a:p>
-            <a:endParaRPr lang="en-US" dirty="0">
-              <a:latin typeface="Arial" panose="020B0604020202020204" pitchFamily="34" charset="0"/>
-              <a:cs typeface="Arial" panose="020B0604020202020204" pitchFamily="34" charset="0"/>
-            </a:endParaRPr>
-          </a:p>
-          <a:p>
-            <a:r>
-              <a:rPr lang="en-US" dirty="0">
-                <a:latin typeface="Arial" panose="020B0604020202020204" pitchFamily="34" charset="0"/>
-                <a:cs typeface="Arial" panose="020B0604020202020204" pitchFamily="34" charset="0"/>
-              </a:rPr>
-              <a:t>In terms of genomics, RNA-</a:t>
-            </a:r>
-            <a:r>
-              <a:rPr lang="en-US" dirty="0" err="1">
-                <a:latin typeface="Arial" panose="020B0604020202020204" pitchFamily="34" charset="0"/>
-                <a:cs typeface="Arial" panose="020B0604020202020204" pitchFamily="34" charset="0"/>
-              </a:rPr>
-              <a:t>seq</a:t>
-            </a:r>
-            <a:r>
-              <a:rPr lang="en-US" dirty="0">
-                <a:latin typeface="Arial" panose="020B0604020202020204" pitchFamily="34" charset="0"/>
-                <a:cs typeface="Arial" panose="020B0604020202020204" pitchFamily="34" charset="0"/>
-              </a:rPr>
-              <a:t> (and microbiome) data are also compositional.</a:t>
-            </a:r>
-          </a:p>
-          <a:p>
-            <a:endParaRPr lang="en-US" dirty="0">
-              <a:latin typeface="Arial" panose="020B0604020202020204" pitchFamily="34" charset="0"/>
-              <a:cs typeface="Arial" panose="020B0604020202020204" pitchFamily="34" charset="0"/>
-            </a:endParaRPr>
-          </a:p>
-          <a:p>
-            <a:r>
-              <a:rPr lang="en-US" dirty="0">
-                <a:latin typeface="Arial" panose="020B0604020202020204" pitchFamily="34" charset="0"/>
-                <a:cs typeface="Arial" panose="020B0604020202020204" pitchFamily="34" charset="0"/>
-              </a:rPr>
-              <a:t>We will talk more about this later (but if you are interested you can read this…)</a:t>
-            </a:r>
-          </a:p>
-          <a:p>
-            <a:endParaRPr lang="en-US" dirty="0">
-              <a:latin typeface="Arial" panose="020B0604020202020204" pitchFamily="34" charset="0"/>
-              <a:cs typeface="Arial" panose="020B0604020202020204" pitchFamily="34" charset="0"/>
-            </a:endParaRPr>
-          </a:p>
-          <a:p>
-            <a:endParaRPr lang="en-US" dirty="0">
-              <a:latin typeface="Arial" panose="020B0604020202020204" pitchFamily="34" charset="0"/>
-              <a:cs typeface="Arial" panose="020B0604020202020204" pitchFamily="34" charset="0"/>
-            </a:endParaRPr>
+              <a:t> work in the same way as for the beta (add 1 for each observation..)</a:t>
+            </a:r>
           </a:p>
         </p:txBody>
       </p:sp>
       <p:pic>
         <p:nvPicPr>
-          <p:cNvPr id="5" name="Picture 4">
-            <a:extLst>
-              <a:ext uri="{FF2B5EF4-FFF2-40B4-BE49-F238E27FC236}">
-                <a16:creationId xmlns:a16="http://schemas.microsoft.com/office/drawing/2014/main" id="{1B85F01F-2086-4881-99C6-37451D695E2F}"/>
+          <p:cNvPr id="6" name="Picture 5">
+            <a:extLst>
+              <a:ext uri="{FF2B5EF4-FFF2-40B4-BE49-F238E27FC236}">
+                <a16:creationId xmlns:a16="http://schemas.microsoft.com/office/drawing/2014/main" id="{4DD201C5-72D1-48F3-9195-EE73932EF52B}"/>
               </a:ext>
             </a:extLst>
           </p:cNvPr>
@@ -3986,8 +3837,8 @@
         </p:blipFill>
         <p:spPr>
           <a:xfrm>
-            <a:off x="4888860" y="2648197"/>
-            <a:ext cx="5953125" cy="1371600"/>
+            <a:off x="928445" y="1021079"/>
+            <a:ext cx="9322995" cy="5582705"/>
           </a:xfrm>
           <a:prstGeom prst="rect">
             <a:avLst/>
@@ -3997,7 +3848,7 @@
     </p:spTree>
     <p:extLst>
       <p:ext uri="{BB962C8B-B14F-4D97-AF65-F5344CB8AC3E}">
-        <p14:creationId xmlns:p14="http://schemas.microsoft.com/office/powerpoint/2010/main" val="1669676234"/>
+        <p14:creationId xmlns:p14="http://schemas.microsoft.com/office/powerpoint/2010/main" val="3771332339"/>
       </p:ext>
     </p:extLst>
   </p:cSld>
@@ -4026,10 +3877,10 @@
       </p:grpSpPr>
       <p:sp>
         <p:nvSpPr>
-          <p:cNvPr id="5" name="TextBox 4">
-            <a:extLst>
-              <a:ext uri="{FF2B5EF4-FFF2-40B4-BE49-F238E27FC236}">
-                <a16:creationId xmlns:a16="http://schemas.microsoft.com/office/drawing/2014/main" id="{A37DF286-B6B2-48FA-B2CD-9E4BAE227ADD}"/>
+          <p:cNvPr id="4" name="TextBox 3">
+            <a:extLst>
+              <a:ext uri="{FF2B5EF4-FFF2-40B4-BE49-F238E27FC236}">
+                <a16:creationId xmlns:a16="http://schemas.microsoft.com/office/drawing/2014/main" id="{D8F1F398-5B8E-4324-8EA9-B2C516541B40}"/>
               </a:ext>
             </a:extLst>
           </p:cNvPr>
@@ -4038,8 +3889,8 @@
         </p:nvSpPr>
         <p:spPr>
           <a:xfrm>
-            <a:off x="225632" y="59379"/>
-            <a:ext cx="11337399" cy="369332"/>
+            <a:off x="35626" y="11876"/>
+            <a:ext cx="9567043" cy="646331"/>
           </a:xfrm>
           <a:prstGeom prst="rect">
             <a:avLst/>
@@ -4057,17 +3908,88 @@
                 <a:latin typeface="Arial" panose="020B0604020202020204" pitchFamily="34" charset="0"/>
                 <a:cs typeface="Arial" panose="020B0604020202020204" pitchFamily="34" charset="0"/>
               </a:rPr>
-              <a:t>We can capture our beliefs about a 3 sided die in 2 dimensions (but that is the most # of sides we can graph!)</a:t>
+              <a:t>Because all the x values have to sum up to 1, the </a:t>
+            </a:r>
+            <a:r>
+              <a:rPr lang="en-US" dirty="0" err="1">
+                <a:latin typeface="Arial" panose="020B0604020202020204" pitchFamily="34" charset="0"/>
+                <a:cs typeface="Arial" panose="020B0604020202020204" pitchFamily="34" charset="0"/>
+              </a:rPr>
+              <a:t>Dirichlet</a:t>
+            </a:r>
+            <a:r>
+              <a:rPr lang="en-US" dirty="0">
+                <a:latin typeface="Arial" panose="020B0604020202020204" pitchFamily="34" charset="0"/>
+                <a:cs typeface="Arial" panose="020B0604020202020204" pitchFamily="34" charset="0"/>
+              </a:rPr>
+              <a:t> is described by a R</a:t>
+            </a:r>
+            <a:r>
+              <a:rPr lang="en-US" baseline="30000" dirty="0">
+                <a:latin typeface="Arial" panose="020B0604020202020204" pitchFamily="34" charset="0"/>
+                <a:cs typeface="Arial" panose="020B0604020202020204" pitchFamily="34" charset="0"/>
+              </a:rPr>
+              <a:t>(k-1)</a:t>
+            </a:r>
+            <a:r>
+              <a:rPr lang="en-US" dirty="0">
+                <a:latin typeface="Arial" panose="020B0604020202020204" pitchFamily="34" charset="0"/>
+                <a:cs typeface="Arial" panose="020B0604020202020204" pitchFamily="34" charset="0"/>
+              </a:rPr>
+              <a:t> subspace.</a:t>
+            </a:r>
+          </a:p>
+          <a:p>
+            <a:r>
+              <a:rPr lang="en-US" dirty="0">
+                <a:latin typeface="Arial" panose="020B0604020202020204" pitchFamily="34" charset="0"/>
+                <a:cs typeface="Arial" panose="020B0604020202020204" pitchFamily="34" charset="0"/>
+              </a:rPr>
+              <a:t>  </a:t>
+            </a:r>
+          </a:p>
+        </p:txBody>
+      </p:sp>
+      <p:sp>
+        <p:nvSpPr>
+          <p:cNvPr id="6" name="Rectangle 5">
+            <a:extLst>
+              <a:ext uri="{FF2B5EF4-FFF2-40B4-BE49-F238E27FC236}">
+                <a16:creationId xmlns:a16="http://schemas.microsoft.com/office/drawing/2014/main" id="{EEB25306-47A5-47E7-834D-C7CE85964843}"/>
+              </a:ext>
+            </a:extLst>
+          </p:cNvPr>
+          <p:cNvSpPr/>
+          <p:nvPr/>
+        </p:nvSpPr>
+        <p:spPr>
+          <a:xfrm>
+            <a:off x="4152404" y="6500543"/>
+            <a:ext cx="11685320" cy="307777"/>
+          </a:xfrm>
+          <a:prstGeom prst="rect">
+            <a:avLst/>
+          </a:prstGeom>
+        </p:spPr>
+        <p:txBody>
+          <a:bodyPr wrap="square">
+            <a:spAutoFit/>
+          </a:bodyPr>
+          <a:lstStyle/>
+          <a:p>
+            <a:r>
+              <a:rPr lang="en-US" sz="1400" dirty="0"/>
+              <a:t>https://github.com/afodor/metagenomicsTools/blob/master/src/classExamples/dirichletUpdateCoinFlip.txt</a:t>
             </a:r>
           </a:p>
         </p:txBody>
       </p:sp>
       <p:pic>
         <p:nvPicPr>
-          <p:cNvPr id="6" name="Picture 5">
-            <a:extLst>
-              <a:ext uri="{FF2B5EF4-FFF2-40B4-BE49-F238E27FC236}">
-                <a16:creationId xmlns:a16="http://schemas.microsoft.com/office/drawing/2014/main" id="{2BDD8117-3B03-47BC-A5BA-9C4110977727}"/>
+          <p:cNvPr id="7" name="Picture 6">
+            <a:extLst>
+              <a:ext uri="{FF2B5EF4-FFF2-40B4-BE49-F238E27FC236}">
+                <a16:creationId xmlns:a16="http://schemas.microsoft.com/office/drawing/2014/main" id="{F7EBE343-6C28-437F-ADEA-0CF3CD21EBB2}"/>
               </a:ext>
             </a:extLst>
           </p:cNvPr>
@@ -4084,8 +4006,8 @@
         </p:blipFill>
         <p:spPr>
           <a:xfrm>
-            <a:off x="497489" y="428711"/>
-            <a:ext cx="5279472" cy="6340224"/>
+            <a:off x="487646" y="539292"/>
+            <a:ext cx="3664758" cy="6080166"/>
           </a:xfrm>
           <a:prstGeom prst="rect">
             <a:avLst/>
@@ -4094,47 +4016,80 @@
       </p:pic>
       <p:sp>
         <p:nvSpPr>
-          <p:cNvPr id="7" name="Rectangle 6">
-            <a:extLst>
-              <a:ext uri="{FF2B5EF4-FFF2-40B4-BE49-F238E27FC236}">
-                <a16:creationId xmlns:a16="http://schemas.microsoft.com/office/drawing/2014/main" id="{FDE7A2F5-DC0E-4E90-8434-F072CD745BA2}"/>
-              </a:ext>
-            </a:extLst>
-          </p:cNvPr>
-          <p:cNvSpPr/>
+          <p:cNvPr id="8" name="TextBox 7">
+            <a:extLst>
+              <a:ext uri="{FF2B5EF4-FFF2-40B4-BE49-F238E27FC236}">
+                <a16:creationId xmlns:a16="http://schemas.microsoft.com/office/drawing/2014/main" id="{B5EBFEC8-D5D5-4738-9369-ECF949EFA4D0}"/>
+              </a:ext>
+            </a:extLst>
+          </p:cNvPr>
+          <p:cNvSpPr txBox="1"/>
           <p:nvPr/>
         </p:nvSpPr>
         <p:spPr>
           <a:xfrm>
-            <a:off x="2125684" y="6481394"/>
-            <a:ext cx="11055928" cy="276999"/>
+            <a:off x="4819147" y="539292"/>
+            <a:ext cx="7314823" cy="923330"/>
           </a:xfrm>
           <a:prstGeom prst="rect">
             <a:avLst/>
           </a:prstGeom>
-        </p:spPr>
-        <p:txBody>
-          <a:bodyPr wrap="square">
+          <a:noFill/>
+        </p:spPr>
+        <p:txBody>
+          <a:bodyPr wrap="none" rtlCol="0">
             <a:spAutoFit/>
           </a:bodyPr>
           <a:lstStyle/>
           <a:p>
             <a:r>
-              <a:rPr lang="en-US" sz="1200" dirty="0">
+              <a:rPr lang="en-US" dirty="0">
                 <a:latin typeface="Arial" panose="020B0604020202020204" pitchFamily="34" charset="0"/>
                 <a:cs typeface="Arial" panose="020B0604020202020204" pitchFamily="34" charset="0"/>
               </a:rPr>
-              <a:t>https://github.com/afodor/metagenomicsTools/blob/master/src/classExamples/dirichletUpdateThreeSidedDie.txt</a:t>
+              <a:t>Our belief in the number of heads perfectly describes our belief in the </a:t>
+            </a:r>
+          </a:p>
+          <a:p>
+            <a:r>
+              <a:rPr lang="en-US" dirty="0">
+                <a:latin typeface="Arial" panose="020B0604020202020204" pitchFamily="34" charset="0"/>
+                <a:cs typeface="Arial" panose="020B0604020202020204" pitchFamily="34" charset="0"/>
+              </a:rPr>
+              <a:t>number of tails, so you capture the </a:t>
+            </a:r>
+            <a:r>
+              <a:rPr lang="en-US" dirty="0" err="1">
+                <a:latin typeface="Arial" panose="020B0604020202020204" pitchFamily="34" charset="0"/>
+                <a:cs typeface="Arial" panose="020B0604020202020204" pitchFamily="34" charset="0"/>
+              </a:rPr>
+              <a:t>Dirichlet</a:t>
+            </a:r>
+            <a:r>
+              <a:rPr lang="en-US" dirty="0">
+                <a:latin typeface="Arial" panose="020B0604020202020204" pitchFamily="34" charset="0"/>
+                <a:cs typeface="Arial" panose="020B0604020202020204" pitchFamily="34" charset="0"/>
+              </a:rPr>
+              <a:t> for a coin </a:t>
+            </a:r>
+          </a:p>
+          <a:p>
+            <a:r>
+              <a:rPr lang="en-US" dirty="0">
+                <a:latin typeface="Arial" panose="020B0604020202020204" pitchFamily="34" charset="0"/>
+                <a:cs typeface="Arial" panose="020B0604020202020204" pitchFamily="34" charset="0"/>
+              </a:rPr>
+              <a:t>in (2-1) = 1 dimension.</a:t>
             </a:r>
           </a:p>
         </p:txBody>
       </p:sp>
       <p:pic>
         <p:nvPicPr>
-          <p:cNvPr id="8" name="Picture 7">
-            <a:extLst>
-              <a:ext uri="{FF2B5EF4-FFF2-40B4-BE49-F238E27FC236}">
-                <a16:creationId xmlns:a16="http://schemas.microsoft.com/office/drawing/2014/main" id="{DFB2B1DA-919A-4799-8486-D29772A4F1CA}"/>
+          <p:cNvPr id="9" name="Picture 8">
+            <a:extLst>
+              <a:ext uri="{FF2B5EF4-FFF2-40B4-BE49-F238E27FC236}">
+                <a16:creationId xmlns:a16="http://schemas.microsoft.com/office/drawing/2014/main" id="{F6C4C23A-3C8E-4841-8147-EB63674D7FBD}"/>
               </a:ext>
             </a:extLst>
           </p:cNvPr>
@@ -4151,8 +4106,8 @@
         </p:blipFill>
         <p:spPr>
           <a:xfrm>
-            <a:off x="5490235" y="924358"/>
-            <a:ext cx="5581650" cy="4676775"/>
+            <a:off x="5251553" y="1990038"/>
+            <a:ext cx="4657725" cy="4324350"/>
           </a:xfrm>
           <a:prstGeom prst="rect">
             <a:avLst/>
@@ -4162,7 +4117,7 @@
     </p:spTree>
     <p:extLst>
       <p:ext uri="{BB962C8B-B14F-4D97-AF65-F5344CB8AC3E}">
-        <p14:creationId xmlns:p14="http://schemas.microsoft.com/office/powerpoint/2010/main" val="3970991555"/>
+        <p14:creationId xmlns:p14="http://schemas.microsoft.com/office/powerpoint/2010/main" val="1521341089"/>
       </p:ext>
     </p:extLst>
   </p:cSld>
@@ -4189,12 +4144,129 @@
           <a:chExt cx="0" cy="0"/>
         </a:xfrm>
       </p:grpSpPr>
+      <p:sp>
+        <p:nvSpPr>
+          <p:cNvPr id="4" name="TextBox 3">
+            <a:extLst>
+              <a:ext uri="{FF2B5EF4-FFF2-40B4-BE49-F238E27FC236}">
+                <a16:creationId xmlns:a16="http://schemas.microsoft.com/office/drawing/2014/main" id="{A3E324D7-2011-45EC-80F6-F854E1128B60}"/>
+              </a:ext>
+            </a:extLst>
+          </p:cNvPr>
+          <p:cNvSpPr txBox="1"/>
+          <p:nvPr/>
+        </p:nvSpPr>
+        <p:spPr>
+          <a:xfrm>
+            <a:off x="463138" y="427512"/>
+            <a:ext cx="8212505" cy="2308324"/>
+          </a:xfrm>
+          <a:prstGeom prst="rect">
+            <a:avLst/>
+          </a:prstGeom>
+          <a:noFill/>
+        </p:spPr>
+        <p:txBody>
+          <a:bodyPr wrap="none" rtlCol="0">
+            <a:spAutoFit/>
+          </a:bodyPr>
+          <a:lstStyle/>
+          <a:p>
+            <a:r>
+              <a:rPr lang="en-US" dirty="0">
+                <a:latin typeface="Arial" panose="020B0604020202020204" pitchFamily="34" charset="0"/>
+                <a:cs typeface="Arial" panose="020B0604020202020204" pitchFamily="34" charset="0"/>
+              </a:rPr>
+              <a:t>The </a:t>
+            </a:r>
+            <a:r>
+              <a:rPr lang="en-US" dirty="0" err="1">
+                <a:latin typeface="Arial" panose="020B0604020202020204" pitchFamily="34" charset="0"/>
+                <a:cs typeface="Arial" panose="020B0604020202020204" pitchFamily="34" charset="0"/>
+              </a:rPr>
+              <a:t>Dirichlet</a:t>
+            </a:r>
+            <a:r>
+              <a:rPr lang="en-US" dirty="0">
+                <a:latin typeface="Arial" panose="020B0604020202020204" pitchFamily="34" charset="0"/>
+                <a:cs typeface="Arial" panose="020B0604020202020204" pitchFamily="34" charset="0"/>
+              </a:rPr>
+              <a:t> describes compositional data.  Data that sums to a constant.</a:t>
+            </a:r>
+          </a:p>
+          <a:p>
+            <a:r>
+              <a:rPr lang="en-US" dirty="0">
+                <a:latin typeface="Arial" panose="020B0604020202020204" pitchFamily="34" charset="0"/>
+                <a:cs typeface="Arial" panose="020B0604020202020204" pitchFamily="34" charset="0"/>
+              </a:rPr>
+              <a:t>Relative abundance.</a:t>
+            </a:r>
+          </a:p>
+          <a:p>
+            <a:endParaRPr lang="en-US" dirty="0">
+              <a:latin typeface="Arial" panose="020B0604020202020204" pitchFamily="34" charset="0"/>
+              <a:cs typeface="Arial" panose="020B0604020202020204" pitchFamily="34" charset="0"/>
+            </a:endParaRPr>
+          </a:p>
+          <a:p>
+            <a:r>
+              <a:rPr lang="en-US" dirty="0">
+                <a:latin typeface="Arial" panose="020B0604020202020204" pitchFamily="34" charset="0"/>
+                <a:cs typeface="Arial" panose="020B0604020202020204" pitchFamily="34" charset="0"/>
+              </a:rPr>
+              <a:t>In terms of genomics, RNA-</a:t>
+            </a:r>
+            <a:r>
+              <a:rPr lang="en-US" dirty="0" err="1">
+                <a:latin typeface="Arial" panose="020B0604020202020204" pitchFamily="34" charset="0"/>
+                <a:cs typeface="Arial" panose="020B0604020202020204" pitchFamily="34" charset="0"/>
+              </a:rPr>
+              <a:t>seq</a:t>
+            </a:r>
+            <a:r>
+              <a:rPr lang="en-US" dirty="0">
+                <a:latin typeface="Arial" panose="020B0604020202020204" pitchFamily="34" charset="0"/>
+                <a:cs typeface="Arial" panose="020B0604020202020204" pitchFamily="34" charset="0"/>
+              </a:rPr>
+              <a:t> (and microbiome) data are also compositional.</a:t>
+            </a:r>
+          </a:p>
+          <a:p>
+            <a:endParaRPr lang="en-US" dirty="0">
+              <a:latin typeface="Arial" panose="020B0604020202020204" pitchFamily="34" charset="0"/>
+              <a:cs typeface="Arial" panose="020B0604020202020204" pitchFamily="34" charset="0"/>
+            </a:endParaRPr>
+          </a:p>
+          <a:p>
+            <a:r>
+              <a:rPr lang="en-US" dirty="0">
+                <a:latin typeface="Arial" panose="020B0604020202020204" pitchFamily="34" charset="0"/>
+                <a:cs typeface="Arial" panose="020B0604020202020204" pitchFamily="34" charset="0"/>
+              </a:rPr>
+              <a:t>We will talk more about this later (but if you are interested you can read this…)</a:t>
+            </a:r>
+          </a:p>
+          <a:p>
+            <a:endParaRPr lang="en-US" dirty="0">
+              <a:latin typeface="Arial" panose="020B0604020202020204" pitchFamily="34" charset="0"/>
+              <a:cs typeface="Arial" panose="020B0604020202020204" pitchFamily="34" charset="0"/>
+            </a:endParaRPr>
+          </a:p>
+          <a:p>
+            <a:endParaRPr lang="en-US" dirty="0">
+              <a:latin typeface="Arial" panose="020B0604020202020204" pitchFamily="34" charset="0"/>
+              <a:cs typeface="Arial" panose="020B0604020202020204" pitchFamily="34" charset="0"/>
+            </a:endParaRPr>
+          </a:p>
+        </p:txBody>
+      </p:sp>
       <p:pic>
         <p:nvPicPr>
-          <p:cNvPr id="4" name="Picture 3">
-            <a:extLst>
-              <a:ext uri="{FF2B5EF4-FFF2-40B4-BE49-F238E27FC236}">
-                <a16:creationId xmlns:a16="http://schemas.microsoft.com/office/drawing/2014/main" id="{00414CEC-8BA1-400C-89EF-7CDC5CB91E76}"/>
+          <p:cNvPr id="5" name="Picture 4">
+            <a:extLst>
+              <a:ext uri="{FF2B5EF4-FFF2-40B4-BE49-F238E27FC236}">
+                <a16:creationId xmlns:a16="http://schemas.microsoft.com/office/drawing/2014/main" id="{1B85F01F-2086-4881-99C6-37451D695E2F}"/>
               </a:ext>
             </a:extLst>
           </p:cNvPr>
@@ -4211,190 +4283,18 @@
         </p:blipFill>
         <p:spPr>
           <a:xfrm>
-            <a:off x="160389" y="0"/>
-            <a:ext cx="5221040" cy="6858000"/>
+            <a:off x="4888860" y="2648197"/>
+            <a:ext cx="5953125" cy="1371600"/>
           </a:xfrm>
           <a:prstGeom prst="rect">
             <a:avLst/>
           </a:prstGeom>
         </p:spPr>
       </p:pic>
-      <p:sp>
-        <p:nvSpPr>
-          <p:cNvPr id="5" name="TextBox 4">
-            <a:extLst>
-              <a:ext uri="{FF2B5EF4-FFF2-40B4-BE49-F238E27FC236}">
-                <a16:creationId xmlns:a16="http://schemas.microsoft.com/office/drawing/2014/main" id="{B57629D3-1AA9-4F29-A2D5-B4097D0038DA}"/>
-              </a:ext>
-            </a:extLst>
-          </p:cNvPr>
-          <p:cNvSpPr txBox="1"/>
-          <p:nvPr/>
-        </p:nvSpPr>
-        <p:spPr>
-          <a:xfrm>
-            <a:off x="6032665" y="356260"/>
-            <a:ext cx="5951309" cy="1477328"/>
-          </a:xfrm>
-          <a:prstGeom prst="rect">
-            <a:avLst/>
-          </a:prstGeom>
-          <a:noFill/>
-        </p:spPr>
-        <p:txBody>
-          <a:bodyPr wrap="none" rtlCol="0">
-            <a:spAutoFit/>
-          </a:bodyPr>
-          <a:lstStyle/>
-          <a:p>
-            <a:r>
-              <a:rPr lang="en-US" dirty="0">
-                <a:latin typeface="Arial" panose="020B0604020202020204" pitchFamily="34" charset="0"/>
-                <a:cs typeface="Arial" panose="020B0604020202020204" pitchFamily="34" charset="0"/>
-              </a:rPr>
-              <a:t>Because the </a:t>
-            </a:r>
-            <a:r>
-              <a:rPr lang="en-US" dirty="0" err="1">
-                <a:latin typeface="Arial" panose="020B0604020202020204" pitchFamily="34" charset="0"/>
-                <a:cs typeface="Arial" panose="020B0604020202020204" pitchFamily="34" charset="0"/>
-              </a:rPr>
-              <a:t>Dirichlet</a:t>
-            </a:r>
-            <a:r>
-              <a:rPr lang="en-US" dirty="0">
-                <a:latin typeface="Arial" panose="020B0604020202020204" pitchFamily="34" charset="0"/>
-                <a:cs typeface="Arial" panose="020B0604020202020204" pitchFamily="34" charset="0"/>
-              </a:rPr>
-              <a:t> is compositional, it can be used</a:t>
-            </a:r>
-          </a:p>
-          <a:p>
-            <a:r>
-              <a:rPr lang="en-US" dirty="0">
-                <a:latin typeface="Arial" panose="020B0604020202020204" pitchFamily="34" charset="0"/>
-                <a:cs typeface="Arial" panose="020B0604020202020204" pitchFamily="34" charset="0"/>
-              </a:rPr>
-              <a:t>to model a mixture of different communities identified by </a:t>
-            </a:r>
-          </a:p>
-          <a:p>
-            <a:r>
-              <a:rPr lang="en-US" dirty="0">
-                <a:latin typeface="Arial" panose="020B0604020202020204" pitchFamily="34" charset="0"/>
-                <a:cs typeface="Arial" panose="020B0604020202020204" pitchFamily="34" charset="0"/>
-              </a:rPr>
-              <a:t>sequencing data</a:t>
-            </a:r>
-          </a:p>
-          <a:p>
-            <a:endParaRPr lang="en-US" dirty="0">
-              <a:latin typeface="Arial" panose="020B0604020202020204" pitchFamily="34" charset="0"/>
-              <a:cs typeface="Arial" panose="020B0604020202020204" pitchFamily="34" charset="0"/>
-            </a:endParaRPr>
-          </a:p>
-          <a:p>
-            <a:endParaRPr lang="en-US" dirty="0">
-              <a:latin typeface="Arial" panose="020B0604020202020204" pitchFamily="34" charset="0"/>
-              <a:cs typeface="Arial" panose="020B0604020202020204" pitchFamily="34" charset="0"/>
-            </a:endParaRPr>
-          </a:p>
-        </p:txBody>
-      </p:sp>
-      <p:pic>
-        <p:nvPicPr>
-          <p:cNvPr id="6" name="Picture 5">
-            <a:extLst>
-              <a:ext uri="{FF2B5EF4-FFF2-40B4-BE49-F238E27FC236}">
-                <a16:creationId xmlns:a16="http://schemas.microsoft.com/office/drawing/2014/main" id="{90A70799-7CAE-4DC3-B38B-EF53DD1C3C96}"/>
-              </a:ext>
-            </a:extLst>
-          </p:cNvPr>
-          <p:cNvPicPr>
-            <a:picLocks noChangeAspect="1"/>
-          </p:cNvPicPr>
-          <p:nvPr/>
-        </p:nvPicPr>
-        <p:blipFill>
-          <a:blip r:embed="rId3"/>
-          <a:stretch>
-            <a:fillRect/>
-          </a:stretch>
-        </p:blipFill>
-        <p:spPr>
-          <a:xfrm>
-            <a:off x="5410200" y="2199657"/>
-            <a:ext cx="6429499" cy="1047503"/>
-          </a:xfrm>
-          <a:prstGeom prst="rect">
-            <a:avLst/>
-          </a:prstGeom>
-        </p:spPr>
-      </p:pic>
-      <p:sp>
-        <p:nvSpPr>
-          <p:cNvPr id="7" name="TextBox 6">
-            <a:extLst>
-              <a:ext uri="{FF2B5EF4-FFF2-40B4-BE49-F238E27FC236}">
-                <a16:creationId xmlns:a16="http://schemas.microsoft.com/office/drawing/2014/main" id="{9AAB943F-2A42-4E55-916B-705887CDA1A2}"/>
-              </a:ext>
-            </a:extLst>
-          </p:cNvPr>
-          <p:cNvSpPr txBox="1"/>
-          <p:nvPr/>
-        </p:nvSpPr>
-        <p:spPr>
-          <a:xfrm>
-            <a:off x="6032665" y="3705101"/>
-            <a:ext cx="5642635" cy="923330"/>
-          </a:xfrm>
-          <a:prstGeom prst="rect">
-            <a:avLst/>
-          </a:prstGeom>
-          <a:noFill/>
-        </p:spPr>
-        <p:txBody>
-          <a:bodyPr wrap="none" rtlCol="0">
-            <a:spAutoFit/>
-          </a:bodyPr>
-          <a:lstStyle/>
-          <a:p>
-            <a:r>
-              <a:rPr lang="en-US" dirty="0"/>
-              <a:t>Here the </a:t>
-            </a:r>
-            <a:r>
-              <a:rPr lang="en-US" dirty="0" err="1"/>
-              <a:t>Dirichlet</a:t>
-            </a:r>
-            <a:r>
-              <a:rPr lang="en-US" dirty="0"/>
-              <a:t> distribution is used to cluster a complex</a:t>
-            </a:r>
-          </a:p>
-          <a:p>
-            <a:r>
-              <a:rPr lang="en-US" dirty="0"/>
-              <a:t>community into K number of states, each represented</a:t>
-            </a:r>
-          </a:p>
-          <a:p>
-            <a:r>
-              <a:rPr lang="en-US" dirty="0"/>
-              <a:t>by their own </a:t>
-            </a:r>
-            <a:r>
-              <a:rPr lang="en-US" dirty="0" err="1"/>
-              <a:t>Dirichlet</a:t>
-            </a:r>
-            <a:endParaRPr lang="en-US" dirty="0"/>
-          </a:p>
-        </p:txBody>
-      </p:sp>
     </p:spTree>
     <p:extLst>
       <p:ext uri="{BB962C8B-B14F-4D97-AF65-F5344CB8AC3E}">
-        <p14:creationId xmlns:p14="http://schemas.microsoft.com/office/powerpoint/2010/main" val="2469844575"/>
+        <p14:creationId xmlns:p14="http://schemas.microsoft.com/office/powerpoint/2010/main" val="1669676234"/>
       </p:ext>
     </p:extLst>
   </p:cSld>
@@ -4421,6 +4321,433 @@
           <a:chExt cx="0" cy="0"/>
         </a:xfrm>
       </p:grpSpPr>
+      <p:sp>
+        <p:nvSpPr>
+          <p:cNvPr id="5" name="TextBox 4">
+            <a:extLst>
+              <a:ext uri="{FF2B5EF4-FFF2-40B4-BE49-F238E27FC236}">
+                <a16:creationId xmlns:a16="http://schemas.microsoft.com/office/drawing/2014/main" id="{A37DF286-B6B2-48FA-B2CD-9E4BAE227ADD}"/>
+              </a:ext>
+            </a:extLst>
+          </p:cNvPr>
+          <p:cNvSpPr txBox="1"/>
+          <p:nvPr/>
+        </p:nvSpPr>
+        <p:spPr>
+          <a:xfrm>
+            <a:off x="225632" y="59379"/>
+            <a:ext cx="11337399" cy="369332"/>
+          </a:xfrm>
+          <a:prstGeom prst="rect">
+            <a:avLst/>
+          </a:prstGeom>
+          <a:noFill/>
+        </p:spPr>
+        <p:txBody>
+          <a:bodyPr wrap="none" rtlCol="0">
+            <a:spAutoFit/>
+          </a:bodyPr>
+          <a:lstStyle/>
+          <a:p>
+            <a:r>
+              <a:rPr lang="en-US" dirty="0">
+                <a:latin typeface="Arial" panose="020B0604020202020204" pitchFamily="34" charset="0"/>
+                <a:cs typeface="Arial" panose="020B0604020202020204" pitchFamily="34" charset="0"/>
+              </a:rPr>
+              <a:t>We can capture our beliefs about a 3 sided die in 2 dimensions (but that is the most # of sides we can graph!)</a:t>
+            </a:r>
+          </a:p>
+        </p:txBody>
+      </p:sp>
+      <p:sp>
+        <p:nvSpPr>
+          <p:cNvPr id="7" name="Rectangle 6">
+            <a:extLst>
+              <a:ext uri="{FF2B5EF4-FFF2-40B4-BE49-F238E27FC236}">
+                <a16:creationId xmlns:a16="http://schemas.microsoft.com/office/drawing/2014/main" id="{FDE7A2F5-DC0E-4E90-8434-F072CD745BA2}"/>
+              </a:ext>
+            </a:extLst>
+          </p:cNvPr>
+          <p:cNvSpPr/>
+          <p:nvPr/>
+        </p:nvSpPr>
+        <p:spPr>
+          <a:xfrm>
+            <a:off x="2125684" y="6481394"/>
+            <a:ext cx="11055928" cy="276999"/>
+          </a:xfrm>
+          <a:prstGeom prst="rect">
+            <a:avLst/>
+          </a:prstGeom>
+        </p:spPr>
+        <p:txBody>
+          <a:bodyPr wrap="square">
+            <a:spAutoFit/>
+          </a:bodyPr>
+          <a:lstStyle/>
+          <a:p>
+            <a:r>
+              <a:rPr lang="en-US" sz="1200" dirty="0">
+                <a:latin typeface="Arial" panose="020B0604020202020204" pitchFamily="34" charset="0"/>
+                <a:cs typeface="Arial" panose="020B0604020202020204" pitchFamily="34" charset="0"/>
+              </a:rPr>
+              <a:t>https://github.com/afodor/metagenomicsTools/blob/master/src/classExamples/dirichletUpdateThreeSidedDie.txt</a:t>
+            </a:r>
+          </a:p>
+        </p:txBody>
+      </p:sp>
+      <p:pic>
+        <p:nvPicPr>
+          <p:cNvPr id="2" name="Picture 1">
+            <a:extLst>
+              <a:ext uri="{FF2B5EF4-FFF2-40B4-BE49-F238E27FC236}">
+                <a16:creationId xmlns:a16="http://schemas.microsoft.com/office/drawing/2014/main" id="{5CD23C84-7054-41B1-AC97-703CC81BEE9C}"/>
+              </a:ext>
+            </a:extLst>
+          </p:cNvPr>
+          <p:cNvPicPr>
+            <a:picLocks noChangeAspect="1"/>
+          </p:cNvPicPr>
+          <p:nvPr/>
+        </p:nvPicPr>
+        <p:blipFill>
+          <a:blip r:embed="rId2"/>
+          <a:stretch>
+            <a:fillRect/>
+          </a:stretch>
+        </p:blipFill>
+        <p:spPr>
+          <a:xfrm>
+            <a:off x="6096000" y="767362"/>
+            <a:ext cx="5293778" cy="5176238"/>
+          </a:xfrm>
+          <a:prstGeom prst="rect">
+            <a:avLst/>
+          </a:prstGeom>
+        </p:spPr>
+      </p:pic>
+      <p:pic>
+        <p:nvPicPr>
+          <p:cNvPr id="3" name="Picture 2">
+            <a:extLst>
+              <a:ext uri="{FF2B5EF4-FFF2-40B4-BE49-F238E27FC236}">
+                <a16:creationId xmlns:a16="http://schemas.microsoft.com/office/drawing/2014/main" id="{6C727753-1F62-4675-8CCB-3EAE3AB5BDF2}"/>
+              </a:ext>
+            </a:extLst>
+          </p:cNvPr>
+          <p:cNvPicPr>
+            <a:picLocks noChangeAspect="1"/>
+          </p:cNvPicPr>
+          <p:nvPr/>
+        </p:nvPicPr>
+        <p:blipFill>
+          <a:blip r:embed="rId3"/>
+          <a:stretch>
+            <a:fillRect/>
+          </a:stretch>
+        </p:blipFill>
+        <p:spPr>
+          <a:xfrm>
+            <a:off x="408305" y="494030"/>
+            <a:ext cx="1837055" cy="2325560"/>
+          </a:xfrm>
+          <a:prstGeom prst="rect">
+            <a:avLst/>
+          </a:prstGeom>
+        </p:spPr>
+      </p:pic>
+      <p:pic>
+        <p:nvPicPr>
+          <p:cNvPr id="4" name="Picture 3">
+            <a:extLst>
+              <a:ext uri="{FF2B5EF4-FFF2-40B4-BE49-F238E27FC236}">
+                <a16:creationId xmlns:a16="http://schemas.microsoft.com/office/drawing/2014/main" id="{84163B59-6323-4D67-A47D-5093C8396140}"/>
+              </a:ext>
+            </a:extLst>
+          </p:cNvPr>
+          <p:cNvPicPr>
+            <a:picLocks noChangeAspect="1"/>
+          </p:cNvPicPr>
+          <p:nvPr/>
+        </p:nvPicPr>
+        <p:blipFill>
+          <a:blip r:embed="rId4"/>
+          <a:stretch>
+            <a:fillRect/>
+          </a:stretch>
+        </p:blipFill>
+        <p:spPr>
+          <a:xfrm>
+            <a:off x="403225" y="2768600"/>
+            <a:ext cx="4972996" cy="3495040"/>
+          </a:xfrm>
+          <a:prstGeom prst="rect">
+            <a:avLst/>
+          </a:prstGeom>
+        </p:spPr>
+      </p:pic>
+    </p:spTree>
+    <p:extLst>
+      <p:ext uri="{BB962C8B-B14F-4D97-AF65-F5344CB8AC3E}">
+        <p14:creationId xmlns:p14="http://schemas.microsoft.com/office/powerpoint/2010/main" val="3970991555"/>
+      </p:ext>
+    </p:extLst>
+  </p:cSld>
+  <p:clrMapOvr>
+    <a:masterClrMapping/>
+  </p:clrMapOvr>
+</p:sld>
+</file>
+
+<file path=ppt/slides/slide16.xml><?xml version="1.0" encoding="utf-8"?>
+<p:sld xmlns:a="http://schemas.openxmlformats.org/drawingml/2006/main" xmlns:r="http://schemas.openxmlformats.org/officeDocument/2006/relationships" xmlns:p="http://schemas.openxmlformats.org/presentationml/2006/main">
+  <p:cSld>
+    <p:spTree>
+      <p:nvGrpSpPr>
+        <p:cNvPr id="1" name=""/>
+        <p:cNvGrpSpPr/>
+        <p:nvPr/>
+      </p:nvGrpSpPr>
+      <p:grpSpPr>
+        <a:xfrm>
+          <a:off x="0" y="0"/>
+          <a:ext cx="0" cy="0"/>
+          <a:chOff x="0" y="0"/>
+          <a:chExt cx="0" cy="0"/>
+        </a:xfrm>
+      </p:grpSpPr>
+      <p:pic>
+        <p:nvPicPr>
+          <p:cNvPr id="4" name="Picture 3">
+            <a:extLst>
+              <a:ext uri="{FF2B5EF4-FFF2-40B4-BE49-F238E27FC236}">
+                <a16:creationId xmlns:a16="http://schemas.microsoft.com/office/drawing/2014/main" id="{00414CEC-8BA1-400C-89EF-7CDC5CB91E76}"/>
+              </a:ext>
+            </a:extLst>
+          </p:cNvPr>
+          <p:cNvPicPr>
+            <a:picLocks noChangeAspect="1"/>
+          </p:cNvPicPr>
+          <p:nvPr/>
+        </p:nvPicPr>
+        <p:blipFill>
+          <a:blip r:embed="rId2"/>
+          <a:stretch>
+            <a:fillRect/>
+          </a:stretch>
+        </p:blipFill>
+        <p:spPr>
+          <a:xfrm>
+            <a:off x="160389" y="0"/>
+            <a:ext cx="5221040" cy="6858000"/>
+          </a:xfrm>
+          <a:prstGeom prst="rect">
+            <a:avLst/>
+          </a:prstGeom>
+        </p:spPr>
+      </p:pic>
+      <p:sp>
+        <p:nvSpPr>
+          <p:cNvPr id="5" name="TextBox 4">
+            <a:extLst>
+              <a:ext uri="{FF2B5EF4-FFF2-40B4-BE49-F238E27FC236}">
+                <a16:creationId xmlns:a16="http://schemas.microsoft.com/office/drawing/2014/main" id="{B57629D3-1AA9-4F29-A2D5-B4097D0038DA}"/>
+              </a:ext>
+            </a:extLst>
+          </p:cNvPr>
+          <p:cNvSpPr txBox="1"/>
+          <p:nvPr/>
+        </p:nvSpPr>
+        <p:spPr>
+          <a:xfrm>
+            <a:off x="6032665" y="356260"/>
+            <a:ext cx="5951309" cy="1477328"/>
+          </a:xfrm>
+          <a:prstGeom prst="rect">
+            <a:avLst/>
+          </a:prstGeom>
+          <a:noFill/>
+        </p:spPr>
+        <p:txBody>
+          <a:bodyPr wrap="none" rtlCol="0">
+            <a:spAutoFit/>
+          </a:bodyPr>
+          <a:lstStyle/>
+          <a:p>
+            <a:r>
+              <a:rPr lang="en-US" dirty="0">
+                <a:latin typeface="Arial" panose="020B0604020202020204" pitchFamily="34" charset="0"/>
+                <a:cs typeface="Arial" panose="020B0604020202020204" pitchFamily="34" charset="0"/>
+              </a:rPr>
+              <a:t>Because the </a:t>
+            </a:r>
+            <a:r>
+              <a:rPr lang="en-US" dirty="0" err="1">
+                <a:latin typeface="Arial" panose="020B0604020202020204" pitchFamily="34" charset="0"/>
+                <a:cs typeface="Arial" panose="020B0604020202020204" pitchFamily="34" charset="0"/>
+              </a:rPr>
+              <a:t>Dirichlet</a:t>
+            </a:r>
+            <a:r>
+              <a:rPr lang="en-US" dirty="0">
+                <a:latin typeface="Arial" panose="020B0604020202020204" pitchFamily="34" charset="0"/>
+                <a:cs typeface="Arial" panose="020B0604020202020204" pitchFamily="34" charset="0"/>
+              </a:rPr>
+              <a:t> is compositional, it can be used</a:t>
+            </a:r>
+          </a:p>
+          <a:p>
+            <a:r>
+              <a:rPr lang="en-US" dirty="0">
+                <a:latin typeface="Arial" panose="020B0604020202020204" pitchFamily="34" charset="0"/>
+                <a:cs typeface="Arial" panose="020B0604020202020204" pitchFamily="34" charset="0"/>
+              </a:rPr>
+              <a:t>to model a mixture of different communities identified by </a:t>
+            </a:r>
+          </a:p>
+          <a:p>
+            <a:r>
+              <a:rPr lang="en-US" dirty="0">
+                <a:latin typeface="Arial" panose="020B0604020202020204" pitchFamily="34" charset="0"/>
+                <a:cs typeface="Arial" panose="020B0604020202020204" pitchFamily="34" charset="0"/>
+              </a:rPr>
+              <a:t>sequencing data</a:t>
+            </a:r>
+          </a:p>
+          <a:p>
+            <a:endParaRPr lang="en-US" dirty="0">
+              <a:latin typeface="Arial" panose="020B0604020202020204" pitchFamily="34" charset="0"/>
+              <a:cs typeface="Arial" panose="020B0604020202020204" pitchFamily="34" charset="0"/>
+            </a:endParaRPr>
+          </a:p>
+          <a:p>
+            <a:endParaRPr lang="en-US" dirty="0">
+              <a:latin typeface="Arial" panose="020B0604020202020204" pitchFamily="34" charset="0"/>
+              <a:cs typeface="Arial" panose="020B0604020202020204" pitchFamily="34" charset="0"/>
+            </a:endParaRPr>
+          </a:p>
+        </p:txBody>
+      </p:sp>
+      <p:pic>
+        <p:nvPicPr>
+          <p:cNvPr id="6" name="Picture 5">
+            <a:extLst>
+              <a:ext uri="{FF2B5EF4-FFF2-40B4-BE49-F238E27FC236}">
+                <a16:creationId xmlns:a16="http://schemas.microsoft.com/office/drawing/2014/main" id="{90A70799-7CAE-4DC3-B38B-EF53DD1C3C96}"/>
+              </a:ext>
+            </a:extLst>
+          </p:cNvPr>
+          <p:cNvPicPr>
+            <a:picLocks noChangeAspect="1"/>
+          </p:cNvPicPr>
+          <p:nvPr/>
+        </p:nvPicPr>
+        <p:blipFill>
+          <a:blip r:embed="rId3"/>
+          <a:stretch>
+            <a:fillRect/>
+          </a:stretch>
+        </p:blipFill>
+        <p:spPr>
+          <a:xfrm>
+            <a:off x="5410200" y="2199657"/>
+            <a:ext cx="6429499" cy="1047503"/>
+          </a:xfrm>
+          <a:prstGeom prst="rect">
+            <a:avLst/>
+          </a:prstGeom>
+        </p:spPr>
+      </p:pic>
+      <p:sp>
+        <p:nvSpPr>
+          <p:cNvPr id="7" name="TextBox 6">
+            <a:extLst>
+              <a:ext uri="{FF2B5EF4-FFF2-40B4-BE49-F238E27FC236}">
+                <a16:creationId xmlns:a16="http://schemas.microsoft.com/office/drawing/2014/main" id="{9AAB943F-2A42-4E55-916B-705887CDA1A2}"/>
+              </a:ext>
+            </a:extLst>
+          </p:cNvPr>
+          <p:cNvSpPr txBox="1"/>
+          <p:nvPr/>
+        </p:nvSpPr>
+        <p:spPr>
+          <a:xfrm>
+            <a:off x="6032665" y="3705101"/>
+            <a:ext cx="5642635" cy="923330"/>
+          </a:xfrm>
+          <a:prstGeom prst="rect">
+            <a:avLst/>
+          </a:prstGeom>
+          <a:noFill/>
+        </p:spPr>
+        <p:txBody>
+          <a:bodyPr wrap="none" rtlCol="0">
+            <a:spAutoFit/>
+          </a:bodyPr>
+          <a:lstStyle/>
+          <a:p>
+            <a:r>
+              <a:rPr lang="en-US" dirty="0"/>
+              <a:t>Here the </a:t>
+            </a:r>
+            <a:r>
+              <a:rPr lang="en-US" dirty="0" err="1"/>
+              <a:t>Dirichlet</a:t>
+            </a:r>
+            <a:r>
+              <a:rPr lang="en-US" dirty="0"/>
+              <a:t> distribution is used to cluster a complex</a:t>
+            </a:r>
+          </a:p>
+          <a:p>
+            <a:r>
+              <a:rPr lang="en-US" dirty="0"/>
+              <a:t>community into K number of states, each represented</a:t>
+            </a:r>
+          </a:p>
+          <a:p>
+            <a:r>
+              <a:rPr lang="en-US" dirty="0"/>
+              <a:t>by their own </a:t>
+            </a:r>
+            <a:r>
+              <a:rPr lang="en-US" dirty="0" err="1"/>
+              <a:t>Dirichlet</a:t>
+            </a:r>
+            <a:endParaRPr lang="en-US" dirty="0"/>
+          </a:p>
+        </p:txBody>
+      </p:sp>
+    </p:spTree>
+    <p:extLst>
+      <p:ext uri="{BB962C8B-B14F-4D97-AF65-F5344CB8AC3E}">
+        <p14:creationId xmlns:p14="http://schemas.microsoft.com/office/powerpoint/2010/main" val="2469844575"/>
+      </p:ext>
+    </p:extLst>
+  </p:cSld>
+  <p:clrMapOvr>
+    <a:masterClrMapping/>
+  </p:clrMapOvr>
+</p:sld>
+</file>
+
+<file path=ppt/slides/slide17.xml><?xml version="1.0" encoding="utf-8"?>
+<p:sld xmlns:a="http://schemas.openxmlformats.org/drawingml/2006/main" xmlns:r="http://schemas.openxmlformats.org/officeDocument/2006/relationships" xmlns:p="http://schemas.openxmlformats.org/presentationml/2006/main">
+  <p:cSld>
+    <p:spTree>
+      <p:nvGrpSpPr>
+        <p:cNvPr id="1" name=""/>
+        <p:cNvGrpSpPr/>
+        <p:nvPr/>
+      </p:nvGrpSpPr>
+      <p:grpSpPr>
+        <a:xfrm>
+          <a:off x="0" y="0"/>
+          <a:ext cx="0" cy="0"/>
+          <a:chOff x="0" y="0"/>
+          <a:chExt cx="0" cy="0"/>
+        </a:xfrm>
+      </p:grpSpPr>
       <p:pic>
         <p:nvPicPr>
           <p:cNvPr id="5" name="Picture 4">
@@ -4524,7 +4851,7 @@
 </p:sld>
 </file>
 
-<file path=ppt/slides/slide16.xml><?xml version="1.0" encoding="utf-8"?>
+<file path=ppt/slides/slide18.xml><?xml version="1.0" encoding="utf-8"?>
 <p:sld xmlns:a="http://schemas.openxmlformats.org/drawingml/2006/main" xmlns:r="http://schemas.openxmlformats.org/officeDocument/2006/relationships" xmlns:p="http://schemas.openxmlformats.org/presentationml/2006/main">
   <p:cSld>
     <p:spTree>
@@ -6267,64 +6594,12 @@
           <a:chExt cx="0" cy="0"/>
         </a:xfrm>
       </p:grpSpPr>
-      <p:sp>
-        <p:nvSpPr>
-          <p:cNvPr id="4" name="TextBox 3">
-            <a:extLst>
-              <a:ext uri="{FF2B5EF4-FFF2-40B4-BE49-F238E27FC236}">
-                <a16:creationId xmlns:a16="http://schemas.microsoft.com/office/drawing/2014/main" id="{383F9260-A1C3-4D2C-AF16-D8D7A2F07C51}"/>
-              </a:ext>
-            </a:extLst>
-          </p:cNvPr>
-          <p:cNvSpPr txBox="1"/>
-          <p:nvPr/>
-        </p:nvSpPr>
-        <p:spPr>
-          <a:xfrm>
-            <a:off x="819397" y="285008"/>
-            <a:ext cx="6823343" cy="369332"/>
-          </a:xfrm>
-          <a:prstGeom prst="rect">
-            <a:avLst/>
-          </a:prstGeom>
-          <a:noFill/>
-        </p:spPr>
-        <p:txBody>
-          <a:bodyPr wrap="none" rtlCol="0">
-            <a:spAutoFit/>
-          </a:bodyPr>
-          <a:lstStyle/>
-          <a:p>
-            <a:r>
-              <a:rPr lang="en-US" dirty="0">
-                <a:latin typeface="Arial" panose="020B0604020202020204" pitchFamily="34" charset="0"/>
-                <a:cs typeface="Arial" panose="020B0604020202020204" pitchFamily="34" charset="0"/>
-              </a:rPr>
-              <a:t>We can recover the beta distribution from the </a:t>
-            </a:r>
-            <a:r>
-              <a:rPr lang="en-US" dirty="0" err="1">
-                <a:latin typeface="Arial" panose="020B0604020202020204" pitchFamily="34" charset="0"/>
-                <a:cs typeface="Arial" panose="020B0604020202020204" pitchFamily="34" charset="0"/>
-              </a:rPr>
-              <a:t>Dirichlet</a:t>
-            </a:r>
-            <a:r>
-              <a:rPr lang="en-US" dirty="0">
-                <a:latin typeface="Arial" panose="020B0604020202020204" pitchFamily="34" charset="0"/>
-                <a:cs typeface="Arial" panose="020B0604020202020204" pitchFamily="34" charset="0"/>
-              </a:rPr>
-              <a:t> distribution</a:t>
-            </a:r>
-          </a:p>
-        </p:txBody>
-      </p:sp>
       <p:pic>
         <p:nvPicPr>
-          <p:cNvPr id="5" name="Picture 4">
-            <a:extLst>
-              <a:ext uri="{FF2B5EF4-FFF2-40B4-BE49-F238E27FC236}">
-                <a16:creationId xmlns:a16="http://schemas.microsoft.com/office/drawing/2014/main" id="{0E60C042-F46D-4F54-BB50-7E369903FF29}"/>
+          <p:cNvPr id="4" name="Picture 3">
+            <a:extLst>
+              <a:ext uri="{FF2B5EF4-FFF2-40B4-BE49-F238E27FC236}">
+                <a16:creationId xmlns:a16="http://schemas.microsoft.com/office/drawing/2014/main" id="{41D55486-7ECC-426E-A4A4-99E30F1C7E35}"/>
               </a:ext>
             </a:extLst>
           </p:cNvPr>
@@ -6341,38 +6616,8 @@
         </p:blipFill>
         <p:spPr>
           <a:xfrm>
-            <a:off x="108166" y="741279"/>
-            <a:ext cx="7153275" cy="3000375"/>
-          </a:xfrm>
-          <a:prstGeom prst="rect">
-            <a:avLst/>
-          </a:prstGeom>
-        </p:spPr>
-      </p:pic>
-      <p:pic>
-        <p:nvPicPr>
-          <p:cNvPr id="6" name="Picture 5">
-            <a:extLst>
-              <a:ext uri="{FF2B5EF4-FFF2-40B4-BE49-F238E27FC236}">
-                <a16:creationId xmlns:a16="http://schemas.microsoft.com/office/drawing/2014/main" id="{3CD87EB4-563B-435D-93BB-E97B83802142}"/>
-              </a:ext>
-            </a:extLst>
-          </p:cNvPr>
-          <p:cNvPicPr>
-            <a:picLocks noChangeAspect="1"/>
-          </p:cNvPicPr>
-          <p:nvPr/>
-        </p:nvPicPr>
-        <p:blipFill>
-          <a:blip r:embed="rId3"/>
-          <a:stretch>
-            <a:fillRect/>
-          </a:stretch>
-        </p:blipFill>
-        <p:spPr>
-          <a:xfrm>
-            <a:off x="6863938" y="951016"/>
-            <a:ext cx="5058886" cy="5082710"/>
+            <a:off x="0" y="864952"/>
+            <a:ext cx="12192000" cy="5128095"/>
           </a:xfrm>
           <a:prstGeom prst="rect">
             <a:avLst/>
@@ -6382,7 +6627,7 @@
     </p:spTree>
     <p:extLst>
       <p:ext uri="{BB962C8B-B14F-4D97-AF65-F5344CB8AC3E}">
-        <p14:creationId xmlns:p14="http://schemas.microsoft.com/office/powerpoint/2010/main" val="561563434"/>
+        <p14:creationId xmlns:p14="http://schemas.microsoft.com/office/powerpoint/2010/main" val="750333130"/>
       </p:ext>
     </p:extLst>
   </p:cSld>

</xml_diff>